<commit_message>
update prediction map slides
</commit_message>
<xml_diff>
--- a/intermediate/00.SpatialFinal.pptx
+++ b/intermediate/00.SpatialFinal.pptx
@@ -5,7 +5,7 @@
     <p:sldMasterId id="2147483840" r:id="rId1"/>
   </p:sldMasterIdLst>
   <p:notesMasterIdLst>
-    <p:notesMasterId r:id="rId38"/>
+    <p:notesMasterId r:id="rId39"/>
   </p:notesMasterIdLst>
   <p:sldIdLst>
     <p:sldId id="256" r:id="rId2"/>
@@ -43,7 +43,8 @@
     <p:sldId id="275" r:id="rId34"/>
     <p:sldId id="276" r:id="rId35"/>
     <p:sldId id="290" r:id="rId36"/>
-    <p:sldId id="282" r:id="rId37"/>
+    <p:sldId id="294" r:id="rId37"/>
+    <p:sldId id="282" r:id="rId38"/>
   </p:sldIdLst>
   <p:sldSz cx="12192000" cy="6858000"/>
   <p:notesSz cx="6858000" cy="9144000"/>
@@ -5954,49 +5955,49 @@
                 <a:gridCol w="1267240">
                   <a:extLst>
                     <a:ext uri="{9D8B030D-6E8A-4147-A177-3AD203B41FA5}">
-                      <a16:colId xmlns="" xmlns:a16="http://schemas.microsoft.com/office/drawing/2014/main" val="1322853193"/>
+                      <a16:colId xmlns:a16="http://schemas.microsoft.com/office/drawing/2014/main" xmlns="" val="1322853193"/>
                     </a:ext>
                   </a:extLst>
                 </a:gridCol>
                 <a:gridCol w="619539">
                   <a:extLst>
                     <a:ext uri="{9D8B030D-6E8A-4147-A177-3AD203B41FA5}">
-                      <a16:colId xmlns="" xmlns:a16="http://schemas.microsoft.com/office/drawing/2014/main" val="402443148"/>
+                      <a16:colId xmlns:a16="http://schemas.microsoft.com/office/drawing/2014/main" xmlns="" val="402443148"/>
                     </a:ext>
                   </a:extLst>
                 </a:gridCol>
                 <a:gridCol w="887068">
                   <a:extLst>
                     <a:ext uri="{9D8B030D-6E8A-4147-A177-3AD203B41FA5}">
-                      <a16:colId xmlns="" xmlns:a16="http://schemas.microsoft.com/office/drawing/2014/main" val="1196661910"/>
+                      <a16:colId xmlns:a16="http://schemas.microsoft.com/office/drawing/2014/main" xmlns="" val="1196661910"/>
                     </a:ext>
                   </a:extLst>
                 </a:gridCol>
                 <a:gridCol w="957470">
                   <a:extLst>
                     <a:ext uri="{9D8B030D-6E8A-4147-A177-3AD203B41FA5}">
-                      <a16:colId xmlns="" xmlns:a16="http://schemas.microsoft.com/office/drawing/2014/main" val="60872944"/>
+                      <a16:colId xmlns:a16="http://schemas.microsoft.com/office/drawing/2014/main" xmlns="" val="60872944"/>
                     </a:ext>
                   </a:extLst>
                 </a:gridCol>
                 <a:gridCol w="858907">
                   <a:extLst>
                     <a:ext uri="{9D8B030D-6E8A-4147-A177-3AD203B41FA5}">
-                      <a16:colId xmlns="" xmlns:a16="http://schemas.microsoft.com/office/drawing/2014/main" val="594538160"/>
+                      <a16:colId xmlns:a16="http://schemas.microsoft.com/office/drawing/2014/main" xmlns="" val="594538160"/>
                     </a:ext>
                   </a:extLst>
                 </a:gridCol>
                 <a:gridCol w="915228">
                   <a:extLst>
                     <a:ext uri="{9D8B030D-6E8A-4147-A177-3AD203B41FA5}">
-                      <a16:colId xmlns="" xmlns:a16="http://schemas.microsoft.com/office/drawing/2014/main" val="2789120124"/>
+                      <a16:colId xmlns:a16="http://schemas.microsoft.com/office/drawing/2014/main" xmlns="" val="2789120124"/>
                     </a:ext>
                   </a:extLst>
                 </a:gridCol>
                 <a:gridCol w="802584">
                   <a:extLst>
                     <a:ext uri="{9D8B030D-6E8A-4147-A177-3AD203B41FA5}">
-                      <a16:colId xmlns="" xmlns:a16="http://schemas.microsoft.com/office/drawing/2014/main" val="1614110508"/>
+                      <a16:colId xmlns:a16="http://schemas.microsoft.com/office/drawing/2014/main" xmlns="" val="1614110508"/>
                     </a:ext>
                   </a:extLst>
                 </a:gridCol>
@@ -6235,7 +6236,7 @@
                 </a:tc>
                 <a:extLst>
                   <a:ext uri="{0D108BD9-81ED-4DB2-BD59-A6C34878D82A}">
-                    <a16:rowId xmlns="" xmlns:a16="http://schemas.microsoft.com/office/drawing/2014/main" val="4163668875"/>
+                    <a16:rowId xmlns:a16="http://schemas.microsoft.com/office/drawing/2014/main" xmlns="" val="4163668875"/>
                   </a:ext>
                 </a:extLst>
               </a:tr>
@@ -6473,7 +6474,7 @@
                 </a:tc>
                 <a:extLst>
                   <a:ext uri="{0D108BD9-81ED-4DB2-BD59-A6C34878D82A}">
-                    <a16:rowId xmlns="" xmlns:a16="http://schemas.microsoft.com/office/drawing/2014/main" val="3356817902"/>
+                    <a16:rowId xmlns:a16="http://schemas.microsoft.com/office/drawing/2014/main" xmlns="" val="3356817902"/>
                   </a:ext>
                 </a:extLst>
               </a:tr>
@@ -6711,7 +6712,7 @@
                 </a:tc>
                 <a:extLst>
                   <a:ext uri="{0D108BD9-81ED-4DB2-BD59-A6C34878D82A}">
-                    <a16:rowId xmlns="" xmlns:a16="http://schemas.microsoft.com/office/drawing/2014/main" val="2875457148"/>
+                    <a16:rowId xmlns:a16="http://schemas.microsoft.com/office/drawing/2014/main" xmlns="" val="2875457148"/>
                   </a:ext>
                 </a:extLst>
               </a:tr>
@@ -6949,7 +6950,7 @@
                 </a:tc>
                 <a:extLst>
                   <a:ext uri="{0D108BD9-81ED-4DB2-BD59-A6C34878D82A}">
-                    <a16:rowId xmlns="" xmlns:a16="http://schemas.microsoft.com/office/drawing/2014/main" val="2470098907"/>
+                    <a16:rowId xmlns:a16="http://schemas.microsoft.com/office/drawing/2014/main" xmlns="" val="2470098907"/>
                   </a:ext>
                 </a:extLst>
               </a:tr>
@@ -7187,7 +7188,7 @@
                 </a:tc>
                 <a:extLst>
                   <a:ext uri="{0D108BD9-81ED-4DB2-BD59-A6C34878D82A}">
-                    <a16:rowId xmlns="" xmlns:a16="http://schemas.microsoft.com/office/drawing/2014/main" val="3225947322"/>
+                    <a16:rowId xmlns:a16="http://schemas.microsoft.com/office/drawing/2014/main" xmlns="" val="3225947322"/>
                   </a:ext>
                 </a:extLst>
               </a:tr>
@@ -7425,7 +7426,7 @@
                 </a:tc>
                 <a:extLst>
                   <a:ext uri="{0D108BD9-81ED-4DB2-BD59-A6C34878D82A}">
-                    <a16:rowId xmlns="" xmlns:a16="http://schemas.microsoft.com/office/drawing/2014/main" val="2476459383"/>
+                    <a16:rowId xmlns:a16="http://schemas.microsoft.com/office/drawing/2014/main" xmlns="" val="2476459383"/>
                   </a:ext>
                 </a:extLst>
               </a:tr>
@@ -8700,13 +8701,13 @@
                       <a:rPr lang="en-US" altLang="zh-CN" i="1">
                         <a:latin typeface="Cambria Math" panose="02040503050406030204" pitchFamily="18" charset="0"/>
                       </a:rPr>
-                      <m:t>𝑙𝑜𝑛𝑔𝑖</m:t>
+                      <m:t>𝑙𝑜𝑛𝑔𝑖𝑡</m:t>
                     </m:r>
                     <m:r>
                       <a:rPr lang="en-US" altLang="zh-CN" b="0" i="1" smtClean="0">
                         <a:latin typeface="Cambria Math" panose="02040503050406030204" pitchFamily="18" charset="0"/>
                       </a:rPr>
-                      <m:t>𝑡𝑢𝑑𝑒</m:t>
+                      <m:t>𝑢𝑑𝑒</m:t>
                     </m:r>
                     <m:r>
                       <a:rPr lang="en-US" altLang="zh-CN" i="1">
@@ -12138,11 +12139,7 @@
           <a:p>
             <a:r>
               <a:rPr lang="en-US" altLang="zh-CN" dirty="0" smtClean="0"/>
-              <a:t>Semivariogram fitting </a:t>
-            </a:r>
-            <a:r>
-              <a:rPr lang="en-US" altLang="zh-CN" dirty="0" smtClean="0"/>
-              <a:t>– WLS with </a:t>
+              <a:t>Semivariogram fitting – WLS with </a:t>
             </a:r>
             <a:r>
               <a:rPr lang="en-US" altLang="zh-CN" dirty="0" err="1" smtClean="0"/>
@@ -12152,7 +12149,6 @@
               <a:rPr lang="en-US" altLang="zh-CN" dirty="0" smtClean="0"/>
               <a:t> weight</a:t>
             </a:r>
-            <a:endParaRPr lang="en-US" altLang="zh-CN" dirty="0" smtClean="0"/>
           </a:p>
           <a:p>
             <a:endParaRPr lang="en-US" altLang="zh-CN" dirty="0"/>
@@ -12582,11 +12578,7 @@
             </a:r>
             <a:r>
               <a:rPr lang="en-US" altLang="zh-CN" dirty="0" smtClean="0"/>
-              <a:t> fitting </a:t>
-            </a:r>
-            <a:r>
-              <a:rPr lang="en-US" altLang="zh-CN" dirty="0" smtClean="0"/>
-              <a:t>– WLS with </a:t>
+              <a:t> fitting – WLS with </a:t>
             </a:r>
             <a:r>
               <a:rPr lang="en-US" altLang="zh-CN" dirty="0" err="1" smtClean="0"/>
@@ -12596,7 +12588,6 @@
               <a:rPr lang="en-US" altLang="zh-CN" dirty="0" smtClean="0"/>
               <a:t> weight</a:t>
             </a:r>
-            <a:endParaRPr lang="en-US" altLang="zh-CN" dirty="0" smtClean="0"/>
           </a:p>
           <a:p>
             <a:pPr marL="0" indent="0">
@@ -14904,6 +14895,13 @@
   <p:clrMapOvr>
     <a:masterClrMapping/>
   </p:clrMapOvr>
+  <p:timing>
+    <p:tnLst>
+      <p:par>
+        <p:cTn id="1" dur="indefinite" restart="never" nodeType="tmRoot"/>
+      </p:par>
+    </p:tnLst>
+  </p:timing>
 </p:sld>
 </file>
 
@@ -14924,45 +14922,212 @@
           <a:chExt cx="0" cy="0"/>
         </a:xfrm>
       </p:grpSpPr>
-      <p:sp>
-        <p:nvSpPr>
-          <p:cNvPr id="2" name="Title 1"/>
-          <p:cNvSpPr>
-            <a:spLocks noGrp="1"/>
-          </p:cNvSpPr>
-          <p:nvPr>
-            <p:ph type="title"/>
-          </p:nvPr>
-        </p:nvSpPr>
-        <p:spPr/>
-        <p:txBody>
-          <a:bodyPr/>
-          <a:lstStyle/>
-          <a:p>
-            <a:r>
-              <a:rPr lang="en-US" dirty="0" smtClean="0"/>
-              <a:t>Appendix</a:t>
-            </a:r>
-            <a:endParaRPr lang="en-US" dirty="0"/>
-          </a:p>
-        </p:txBody>
-      </p:sp>
-      <p:sp>
-        <p:nvSpPr>
-          <p:cNvPr id="3" name="Content Placeholder 2"/>
-          <p:cNvSpPr>
-            <a:spLocks noGrp="1"/>
-          </p:cNvSpPr>
+      <p:pic>
+        <p:nvPicPr>
+          <p:cNvPr id="7" name="内容占位符 6" descr="屏幕剪辑"/>
+          <p:cNvPicPr>
+            <a:picLocks noGrp="1" noChangeAspect="1"/>
+          </p:cNvPicPr>
           <p:nvPr>
             <p:ph idx="1"/>
           </p:nvPr>
-        </p:nvSpPr>
-        <p:spPr/>
+        </p:nvPicPr>
+        <p:blipFill>
+          <a:blip r:embed="rId2">
+            <a:extLst>
+              <a:ext uri="{28A0092B-C50C-407E-A947-70E740481C1C}">
+                <a14:useLocalDpi xmlns:a14="http://schemas.microsoft.com/office/drawing/2010/main" val="0"/>
+              </a:ext>
+            </a:extLst>
+          </a:blip>
+          <a:stretch>
+            <a:fillRect/>
+          </a:stretch>
+        </p:blipFill>
+        <p:spPr>
+          <a:xfrm>
+            <a:off x="70338" y="105510"/>
+            <a:ext cx="3931521" cy="3235569"/>
+          </a:xfrm>
+        </p:spPr>
+      </p:pic>
+      <p:pic>
+        <p:nvPicPr>
+          <p:cNvPr id="8" name="图片 7" descr="屏幕剪辑"/>
+          <p:cNvPicPr>
+            <a:picLocks noChangeAspect="1"/>
+          </p:cNvPicPr>
+          <p:nvPr/>
+        </p:nvPicPr>
+        <p:blipFill>
+          <a:blip r:embed="rId3">
+            <a:extLst>
+              <a:ext uri="{28A0092B-C50C-407E-A947-70E740481C1C}">
+                <a14:useLocalDpi xmlns:a14="http://schemas.microsoft.com/office/drawing/2010/main" val="0"/>
+              </a:ext>
+            </a:extLst>
+          </a:blip>
+          <a:stretch>
+            <a:fillRect/>
+          </a:stretch>
+        </p:blipFill>
+        <p:spPr>
+          <a:xfrm>
+            <a:off x="4126310" y="105510"/>
+            <a:ext cx="3924118" cy="3235569"/>
+          </a:xfrm>
+          <a:prstGeom prst="rect">
+            <a:avLst/>
+          </a:prstGeom>
+        </p:spPr>
+      </p:pic>
+      <p:pic>
+        <p:nvPicPr>
+          <p:cNvPr id="9" name="图片 8" descr="屏幕剪辑"/>
+          <p:cNvPicPr>
+            <a:picLocks noChangeAspect="1"/>
+          </p:cNvPicPr>
+          <p:nvPr/>
+        </p:nvPicPr>
+        <p:blipFill>
+          <a:blip r:embed="rId4">
+            <a:extLst>
+              <a:ext uri="{28A0092B-C50C-407E-A947-70E740481C1C}">
+                <a14:useLocalDpi xmlns:a14="http://schemas.microsoft.com/office/drawing/2010/main" val="0"/>
+              </a:ext>
+            </a:extLst>
+          </a:blip>
+          <a:stretch>
+            <a:fillRect/>
+          </a:stretch>
+        </p:blipFill>
+        <p:spPr>
+          <a:xfrm>
+            <a:off x="8174877" y="105510"/>
+            <a:ext cx="3952541" cy="3235569"/>
+          </a:xfrm>
+          <a:prstGeom prst="rect">
+            <a:avLst/>
+          </a:prstGeom>
+        </p:spPr>
+      </p:pic>
+      <p:pic>
+        <p:nvPicPr>
+          <p:cNvPr id="10" name="图片 9" descr="屏幕剪辑"/>
+          <p:cNvPicPr>
+            <a:picLocks noChangeAspect="1"/>
+          </p:cNvPicPr>
+          <p:nvPr/>
+        </p:nvPicPr>
+        <p:blipFill>
+          <a:blip r:embed="rId5">
+            <a:extLst>
+              <a:ext uri="{28A0092B-C50C-407E-A947-70E740481C1C}">
+                <a14:useLocalDpi xmlns:a14="http://schemas.microsoft.com/office/drawing/2010/main" val="0"/>
+              </a:ext>
+            </a:extLst>
+          </a:blip>
+          <a:stretch>
+            <a:fillRect/>
+          </a:stretch>
+        </p:blipFill>
+        <p:spPr>
+          <a:xfrm>
+            <a:off x="70339" y="3534247"/>
+            <a:ext cx="3931521" cy="3230553"/>
+          </a:xfrm>
+          <a:prstGeom prst="rect">
+            <a:avLst/>
+          </a:prstGeom>
+        </p:spPr>
+      </p:pic>
+      <p:pic>
+        <p:nvPicPr>
+          <p:cNvPr id="11" name="图片 10" descr="屏幕剪辑"/>
+          <p:cNvPicPr>
+            <a:picLocks noChangeAspect="1"/>
+          </p:cNvPicPr>
+          <p:nvPr/>
+        </p:nvPicPr>
+        <p:blipFill>
+          <a:blip r:embed="rId6">
+            <a:extLst>
+              <a:ext uri="{28A0092B-C50C-407E-A947-70E740481C1C}">
+                <a14:useLocalDpi xmlns:a14="http://schemas.microsoft.com/office/drawing/2010/main" val="0"/>
+              </a:ext>
+            </a:extLst>
+          </a:blip>
+          <a:stretch>
+            <a:fillRect/>
+          </a:stretch>
+        </p:blipFill>
+        <p:spPr>
+          <a:xfrm>
+            <a:off x="4126309" y="3509085"/>
+            <a:ext cx="3924119" cy="3239537"/>
+          </a:xfrm>
+          <a:prstGeom prst="rect">
+            <a:avLst/>
+          </a:prstGeom>
+        </p:spPr>
+      </p:pic>
+      <p:sp>
+        <p:nvSpPr>
+          <p:cNvPr id="13" name="文本框 12"/>
+          <p:cNvSpPr txBox="1"/>
+          <p:nvPr/>
+        </p:nvSpPr>
+        <p:spPr>
+          <a:xfrm>
+            <a:off x="2549768" y="2936631"/>
+            <a:ext cx="9577649" cy="369332"/>
+          </a:xfrm>
+          <a:prstGeom prst="rect">
+            <a:avLst/>
+          </a:prstGeom>
+          <a:noFill/>
+        </p:spPr>
         <p:txBody>
-          <a:bodyPr/>
+          <a:bodyPr wrap="square" rtlCol="0">
+            <a:spAutoFit/>
+          </a:bodyPr>
           <a:lstStyle/>
           <a:p>
-            <a:endParaRPr lang="en-US"/>
+            <a:r>
+              <a:rPr lang="en-US" altLang="zh-CN" dirty="0" smtClean="0"/>
+              <a:t>5:00~6:00                                       6:00~7:00                                       7:00~8:00</a:t>
+            </a:r>
+            <a:endParaRPr lang="zh-CN" altLang="en-US" dirty="0"/>
+          </a:p>
+        </p:txBody>
+      </p:sp>
+      <p:sp>
+        <p:nvSpPr>
+          <p:cNvPr id="14" name="文本框 13"/>
+          <p:cNvSpPr txBox="1"/>
+          <p:nvPr/>
+        </p:nvSpPr>
+        <p:spPr>
+          <a:xfrm>
+            <a:off x="2549767" y="6379290"/>
+            <a:ext cx="9577649" cy="369332"/>
+          </a:xfrm>
+          <a:prstGeom prst="rect">
+            <a:avLst/>
+          </a:prstGeom>
+          <a:noFill/>
+        </p:spPr>
+        <p:txBody>
+          <a:bodyPr wrap="square" rtlCol="0">
+            <a:spAutoFit/>
+          </a:bodyPr>
+          <a:lstStyle/>
+          <a:p>
+            <a:r>
+              <a:rPr lang="en-US" altLang="zh-CN" dirty="0" smtClean="0"/>
+              <a:t>8:00~9:00                                     9:00~10:00</a:t>
+            </a:r>
+            <a:endParaRPr lang="zh-CN" altLang="en-US" dirty="0"/>
           </a:p>
         </p:txBody>
       </p:sp>
@@ -14987,6 +15152,72 @@
 </file>
 
 <file path=ppt/slides/slide36.xml><?xml version="1.0" encoding="utf-8"?>
+<p:sld xmlns:a="http://schemas.openxmlformats.org/drawingml/2006/main" xmlns:r="http://schemas.openxmlformats.org/officeDocument/2006/relationships" xmlns:p="http://schemas.openxmlformats.org/presentationml/2006/main">
+  <p:cSld>
+    <p:spTree>
+      <p:nvGrpSpPr>
+        <p:cNvPr id="1" name=""/>
+        <p:cNvGrpSpPr/>
+        <p:nvPr/>
+      </p:nvGrpSpPr>
+      <p:grpSpPr>
+        <a:xfrm>
+          <a:off x="0" y="0"/>
+          <a:ext cx="0" cy="0"/>
+          <a:chOff x="0" y="0"/>
+          <a:chExt cx="0" cy="0"/>
+        </a:xfrm>
+      </p:grpSpPr>
+      <p:pic>
+        <p:nvPicPr>
+          <p:cNvPr id="3" name="内容占位符 2" descr="屏幕剪辑"/>
+          <p:cNvPicPr>
+            <a:picLocks noGrp="1" noChangeAspect="1"/>
+          </p:cNvPicPr>
+          <p:nvPr>
+            <p:ph idx="1"/>
+          </p:nvPr>
+        </p:nvPicPr>
+        <p:blipFill>
+          <a:blip r:embed="rId2">
+            <a:extLst>
+              <a:ext uri="{28A0092B-C50C-407E-A947-70E740481C1C}">
+                <a14:useLocalDpi xmlns:a14="http://schemas.microsoft.com/office/drawing/2010/main" val="0"/>
+              </a:ext>
+            </a:extLst>
+          </a:blip>
+          <a:stretch>
+            <a:fillRect/>
+          </a:stretch>
+        </p:blipFill>
+        <p:spPr>
+          <a:xfrm>
+            <a:off x="1406769" y="272757"/>
+            <a:ext cx="7666893" cy="6329367"/>
+          </a:xfrm>
+        </p:spPr>
+      </p:pic>
+    </p:spTree>
+    <p:extLst>
+      <p:ext uri="{BB962C8B-B14F-4D97-AF65-F5344CB8AC3E}">
+        <p14:creationId xmlns:p14="http://schemas.microsoft.com/office/powerpoint/2010/main" val="2556272270"/>
+      </p:ext>
+    </p:extLst>
+  </p:cSld>
+  <p:clrMapOvr>
+    <a:masterClrMapping/>
+  </p:clrMapOvr>
+  <p:timing>
+    <p:tnLst>
+      <p:par>
+        <p:cTn id="1" dur="indefinite" restart="never" nodeType="tmRoot"/>
+      </p:par>
+    </p:tnLst>
+  </p:timing>
+</p:sld>
+</file>
+
+<file path=ppt/slides/slide37.xml><?xml version="1.0" encoding="utf-8"?>
 <p:sld xmlns:a="http://schemas.openxmlformats.org/drawingml/2006/main" xmlns:r="http://schemas.openxmlformats.org/officeDocument/2006/relationships" xmlns:p="http://schemas.openxmlformats.org/presentationml/2006/main">
   <p:cSld>
     <p:spTree>
@@ -15065,6 +15296,13 @@
   <p:clrMapOvr>
     <a:masterClrMapping/>
   </p:clrMapOvr>
+  <p:timing>
+    <p:tnLst>
+      <p:par>
+        <p:cTn id="1" dur="indefinite" restart="never" nodeType="tmRoot"/>
+      </p:par>
+    </p:tnLst>
+  </p:timing>
 </p:sld>
 </file>
 

</xml_diff>